<commit_message>
Modifyed preprocess.py and Added Multi linear model 2
</commit_message>
<xml_diff>
--- a/Presentation_record.pptx
+++ b/Presentation_record.pptx
@@ -7,6 +7,12 @@
   <p:sldIdLst>
     <p:sldId id="256" r:id="rId2"/>
     <p:sldId id="257" r:id="rId3"/>
+    <p:sldId id="258" r:id="rId4"/>
+    <p:sldId id="259" r:id="rId5"/>
+    <p:sldId id="261" r:id="rId6"/>
+    <p:sldId id="260" r:id="rId7"/>
+    <p:sldId id="263" r:id="rId8"/>
+    <p:sldId id="262" r:id="rId9"/>
   </p:sldIdLst>
   <p:sldSz cx="12192000" cy="6858000"/>
   <p:notesSz cx="6858000" cy="9144000"/>
@@ -3109,13 +3115,8 @@
             </a:r>
             <a:r>
               <a:rPr lang="en-US" dirty="0" smtClean="0"/>
-              <a:t> feature relation with </a:t>
-            </a:r>
-            <a:r>
-              <a:rPr lang="en-US" smtClean="0"/>
-              <a:t>other feature:</a:t>
-            </a:r>
-            <a:endParaRPr lang="en-US" dirty="0" smtClean="0"/>
+              <a:t> feature relation with other feature:</a:t>
+            </a:r>
           </a:p>
           <a:p>
             <a:pPr lvl="1"/>
@@ -3198,6 +3199,1361 @@
     <p:extLst>
       <p:ext uri="{BB962C8B-B14F-4D97-AF65-F5344CB8AC3E}">
         <p14:creationId xmlns:p14="http://schemas.microsoft.com/office/powerpoint/2010/main" val="1965759711"/>
+      </p:ext>
+    </p:extLst>
+  </p:cSld>
+  <p:clrMapOvr>
+    <a:masterClrMapping/>
+  </p:clrMapOvr>
+</p:sld>
+</file>
+
+<file path=ppt/slides/slide3.xml><?xml version="1.0" encoding="utf-8"?>
+<p:sld xmlns:a="http://schemas.openxmlformats.org/drawingml/2006/main" xmlns:r="http://schemas.openxmlformats.org/officeDocument/2006/relationships" xmlns:p="http://schemas.openxmlformats.org/presentationml/2006/main">
+  <p:cSld>
+    <p:spTree>
+      <p:nvGrpSpPr>
+        <p:cNvPr id="1" name=""/>
+        <p:cNvGrpSpPr/>
+        <p:nvPr/>
+      </p:nvGrpSpPr>
+      <p:grpSpPr>
+        <a:xfrm>
+          <a:off x="0" y="0"/>
+          <a:ext cx="0" cy="0"/>
+          <a:chOff x="0" y="0"/>
+          <a:chExt cx="0" cy="0"/>
+        </a:xfrm>
+      </p:grpSpPr>
+      <p:sp>
+        <p:nvSpPr>
+          <p:cNvPr id="2" name="Title 1"/>
+          <p:cNvSpPr>
+            <a:spLocks noGrp="1"/>
+          </p:cNvSpPr>
+          <p:nvPr>
+            <p:ph type="title"/>
+          </p:nvPr>
+        </p:nvSpPr>
+        <p:spPr/>
+        <p:txBody>
+          <a:bodyPr/>
+          <a:lstStyle/>
+          <a:p>
+            <a:r>
+              <a:rPr lang="en-US" dirty="0" err="1" smtClean="0"/>
+              <a:t>MoSold</a:t>
+            </a:r>
+            <a:r>
+              <a:rPr lang="en-US" dirty="0" smtClean="0"/>
+              <a:t> and </a:t>
+            </a:r>
+            <a:r>
+              <a:rPr lang="en-US" dirty="0" err="1" smtClean="0"/>
+              <a:t>YrSold</a:t>
+            </a:r>
+            <a:endParaRPr lang="en-US" dirty="0"/>
+          </a:p>
+        </p:txBody>
+      </p:sp>
+      <p:sp>
+        <p:nvSpPr>
+          <p:cNvPr id="3" name="Content Placeholder 2"/>
+          <p:cNvSpPr>
+            <a:spLocks noGrp="1"/>
+          </p:cNvSpPr>
+          <p:nvPr>
+            <p:ph idx="1"/>
+          </p:nvPr>
+        </p:nvSpPr>
+        <p:spPr>
+          <a:xfrm>
+            <a:off x="838200" y="1539187"/>
+            <a:ext cx="9043930" cy="3781960"/>
+          </a:xfrm>
+        </p:spPr>
+        <p:txBody>
+          <a:bodyPr>
+            <a:normAutofit/>
+          </a:bodyPr>
+          <a:lstStyle/>
+          <a:p>
+            <a:r>
+              <a:rPr lang="nb-NO" sz="1200" dirty="0" smtClean="0"/>
+              <a:t>ANOVA test for </a:t>
+            </a:r>
+            <a:r>
+              <a:rPr lang="nb-NO" sz="1200" dirty="0" err="1" smtClean="0"/>
+              <a:t>the</a:t>
+            </a:r>
+            <a:r>
+              <a:rPr lang="nb-NO" sz="1200" dirty="0" smtClean="0"/>
+              <a:t> 12 </a:t>
+            </a:r>
+            <a:r>
+              <a:rPr lang="nb-NO" sz="1200" dirty="0" err="1" smtClean="0"/>
+              <a:t>months</a:t>
+            </a:r>
+            <a:r>
+              <a:rPr lang="nb-NO" sz="1200" dirty="0" smtClean="0"/>
+              <a:t>: 	p-</a:t>
+            </a:r>
+            <a:r>
+              <a:rPr lang="nb-NO" sz="1200" dirty="0" err="1" smtClean="0"/>
+              <a:t>value</a:t>
+            </a:r>
+            <a:r>
+              <a:rPr lang="nb-NO" sz="1200" dirty="0" smtClean="0"/>
+              <a:t>,	0.4833</a:t>
+            </a:r>
+          </a:p>
+          <a:p>
+            <a:r>
+              <a:rPr lang="nb-NO" sz="1200" dirty="0" err="1" smtClean="0"/>
+              <a:t>Drop</a:t>
+            </a:r>
+            <a:r>
+              <a:rPr lang="nb-NO" sz="1200" dirty="0" smtClean="0"/>
+              <a:t> </a:t>
+            </a:r>
+            <a:r>
+              <a:rPr lang="nb-NO" sz="1200" dirty="0" err="1" smtClean="0"/>
+              <a:t>column</a:t>
+            </a:r>
+            <a:endParaRPr lang="nb-NO" sz="1200" dirty="0" smtClean="0"/>
+          </a:p>
+          <a:p>
+            <a:endParaRPr lang="nb-NO" sz="1200" dirty="0"/>
+          </a:p>
+          <a:p>
+            <a:r>
+              <a:rPr lang="nb-NO" sz="1200" dirty="0" smtClean="0"/>
+              <a:t>ANOVA test for </a:t>
+            </a:r>
+            <a:r>
+              <a:rPr lang="nb-NO" sz="1200" dirty="0" err="1" smtClean="0"/>
+              <a:t>the</a:t>
+            </a:r>
+            <a:r>
+              <a:rPr lang="nb-NO" sz="1200" dirty="0" smtClean="0"/>
+              <a:t> 2006 -2010 </a:t>
+            </a:r>
+            <a:r>
+              <a:rPr lang="nb-NO" sz="1200" dirty="0" err="1" smtClean="0"/>
+              <a:t>Years</a:t>
+            </a:r>
+            <a:r>
+              <a:rPr lang="nb-NO" sz="1200" dirty="0" smtClean="0"/>
+              <a:t>: 	p-</a:t>
+            </a:r>
+            <a:r>
+              <a:rPr lang="nb-NO" sz="1200" dirty="0" err="1" smtClean="0"/>
+              <a:t>value</a:t>
+            </a:r>
+            <a:r>
+              <a:rPr lang="nb-NO" sz="1200" dirty="0" smtClean="0"/>
+              <a:t>,	0.5656</a:t>
+            </a:r>
+            <a:endParaRPr lang="en-US" sz="1200" dirty="0" smtClean="0"/>
+          </a:p>
+          <a:p>
+            <a:r>
+              <a:rPr lang="nb-NO" sz="1200" dirty="0" err="1" smtClean="0"/>
+              <a:t>Drop</a:t>
+            </a:r>
+            <a:r>
+              <a:rPr lang="nb-NO" sz="1200" dirty="0" smtClean="0"/>
+              <a:t> </a:t>
+            </a:r>
+            <a:r>
+              <a:rPr lang="nb-NO" sz="1200" dirty="0" err="1" smtClean="0"/>
+              <a:t>column</a:t>
+            </a:r>
+            <a:endParaRPr lang="nb-NO" sz="1200" dirty="0" smtClean="0"/>
+          </a:p>
+        </p:txBody>
+      </p:sp>
+    </p:spTree>
+    <p:extLst>
+      <p:ext uri="{BB962C8B-B14F-4D97-AF65-F5344CB8AC3E}">
+        <p14:creationId xmlns:p14="http://schemas.microsoft.com/office/powerpoint/2010/main" val="715675796"/>
+      </p:ext>
+    </p:extLst>
+  </p:cSld>
+  <p:clrMapOvr>
+    <a:masterClrMapping/>
+  </p:clrMapOvr>
+</p:sld>
+</file>
+
+<file path=ppt/slides/slide4.xml><?xml version="1.0" encoding="utf-8"?>
+<p:sld xmlns:a="http://schemas.openxmlformats.org/drawingml/2006/main" xmlns:r="http://schemas.openxmlformats.org/officeDocument/2006/relationships" xmlns:p="http://schemas.openxmlformats.org/presentationml/2006/main">
+  <p:cSld>
+    <p:spTree>
+      <p:nvGrpSpPr>
+        <p:cNvPr id="1" name=""/>
+        <p:cNvGrpSpPr/>
+        <p:nvPr/>
+      </p:nvGrpSpPr>
+      <p:grpSpPr>
+        <a:xfrm>
+          <a:off x="0" y="0"/>
+          <a:ext cx="0" cy="0"/>
+          <a:chOff x="0" y="0"/>
+          <a:chExt cx="0" cy="0"/>
+        </a:xfrm>
+      </p:grpSpPr>
+      <p:sp>
+        <p:nvSpPr>
+          <p:cNvPr id="2" name="Title 1"/>
+          <p:cNvSpPr>
+            <a:spLocks noGrp="1"/>
+          </p:cNvSpPr>
+          <p:nvPr>
+            <p:ph type="title"/>
+          </p:nvPr>
+        </p:nvSpPr>
+        <p:spPr/>
+        <p:txBody>
+          <a:bodyPr/>
+          <a:lstStyle/>
+          <a:p>
+            <a:r>
+              <a:rPr lang="en-US" dirty="0" err="1" smtClean="0"/>
+              <a:t>MSSubClass</a:t>
+            </a:r>
+            <a:endParaRPr lang="en-US" dirty="0"/>
+          </a:p>
+        </p:txBody>
+      </p:sp>
+      <p:sp>
+        <p:nvSpPr>
+          <p:cNvPr id="3" name="Content Placeholder 2"/>
+          <p:cNvSpPr>
+            <a:spLocks noGrp="1"/>
+          </p:cNvSpPr>
+          <p:nvPr>
+            <p:ph idx="1"/>
+          </p:nvPr>
+        </p:nvSpPr>
+        <p:spPr>
+          <a:xfrm>
+            <a:off x="838200" y="1825625"/>
+            <a:ext cx="10817646" cy="4351338"/>
+          </a:xfrm>
+        </p:spPr>
+        <p:txBody>
+          <a:bodyPr>
+            <a:normAutofit fontScale="70000" lnSpcReduction="20000"/>
+          </a:bodyPr>
+          <a:lstStyle/>
+          <a:p>
+            <a:pPr marL="0" indent="0">
+              <a:lnSpc>
+                <a:spcPct val="100000"/>
+              </a:lnSpc>
+              <a:spcBef>
+                <a:spcPts val="0"/>
+              </a:spcBef>
+              <a:buNone/>
+            </a:pPr>
+            <a:r>
+              <a:rPr lang="nb-NO" dirty="0" err="1" smtClean="0"/>
+              <a:t>MSSubClass</a:t>
+            </a:r>
+            <a:r>
+              <a:rPr lang="nb-NO" dirty="0" smtClean="0"/>
+              <a:t> 	</a:t>
+            </a:r>
+            <a:r>
+              <a:rPr lang="nb-NO" dirty="0" err="1" smtClean="0"/>
+              <a:t>description</a:t>
+            </a:r>
+            <a:r>
+              <a:rPr lang="nb-NO" dirty="0" smtClean="0"/>
+              <a:t>			</a:t>
+            </a:r>
+            <a:r>
+              <a:rPr lang="nb-NO" dirty="0"/>
+              <a:t> </a:t>
+            </a:r>
+            <a:r>
+              <a:rPr lang="nb-NO" dirty="0" smtClean="0"/>
+              <a:t>  </a:t>
+            </a:r>
+            <a:r>
+              <a:rPr lang="nb-NO" dirty="0" err="1" smtClean="0"/>
+              <a:t>mean</a:t>
+            </a:r>
+            <a:r>
+              <a:rPr lang="nb-NO" dirty="0" smtClean="0"/>
+              <a:t> Price		Counts</a:t>
+            </a:r>
+          </a:p>
+          <a:p>
+            <a:pPr marL="0" indent="0">
+              <a:lnSpc>
+                <a:spcPct val="100000"/>
+              </a:lnSpc>
+              <a:spcBef>
+                <a:spcPts val="0"/>
+              </a:spcBef>
+              <a:buNone/>
+            </a:pPr>
+            <a:r>
+              <a:rPr lang="nb-NO" dirty="0" smtClean="0"/>
+              <a:t>20, 	1-STORY 1946 &amp; NEWER ALL STYLES,  	$185224.811567		</a:t>
+            </a:r>
+            <a:r>
+              <a:rPr lang="cs-CZ" dirty="0" smtClean="0"/>
+              <a:t> 536</a:t>
+            </a:r>
+            <a:endParaRPr lang="nb-NO" dirty="0" smtClean="0"/>
+          </a:p>
+          <a:p>
+            <a:pPr marL="0" indent="0">
+              <a:lnSpc>
+                <a:spcPct val="100000"/>
+              </a:lnSpc>
+              <a:spcBef>
+                <a:spcPts val="0"/>
+              </a:spcBef>
+              <a:buNone/>
+            </a:pPr>
+            <a:r>
+              <a:rPr lang="nb-NO" dirty="0" smtClean="0"/>
+              <a:t>30,</a:t>
+            </a:r>
+            <a:r>
+              <a:rPr lang="de-DE" dirty="0" smtClean="0"/>
+              <a:t> 	1-STORY 1945 &amp; OLDER,	 </a:t>
+            </a:r>
+            <a:r>
+              <a:rPr lang="nb-NO" dirty="0" smtClean="0"/>
+              <a:t> 		$95829.724638		 69</a:t>
+            </a:r>
+          </a:p>
+          <a:p>
+            <a:pPr marL="0" indent="0">
+              <a:lnSpc>
+                <a:spcPct val="100000"/>
+              </a:lnSpc>
+              <a:spcBef>
+                <a:spcPts val="0"/>
+              </a:spcBef>
+              <a:buNone/>
+            </a:pPr>
+            <a:r>
+              <a:rPr lang="nb-NO" dirty="0" smtClean="0"/>
+              <a:t>40, 	1-STORY W/FINISHED ATTIC ALL AGES, 	$156125.000000		 4</a:t>
+            </a:r>
+          </a:p>
+          <a:p>
+            <a:pPr marL="0" indent="0">
+              <a:lnSpc>
+                <a:spcPct val="100000"/>
+              </a:lnSpc>
+              <a:spcBef>
+                <a:spcPts val="0"/>
+              </a:spcBef>
+              <a:buNone/>
+            </a:pPr>
+            <a:r>
+              <a:rPr lang="nb-NO" dirty="0" smtClean="0"/>
+              <a:t>45,	 1-1/2 STORY - UNFINISHED ALL AGES 	108591.666667		</a:t>
+            </a:r>
+            <a:r>
+              <a:rPr lang="is-IS" dirty="0" smtClean="0"/>
+              <a:t> 12</a:t>
+            </a:r>
+            <a:endParaRPr lang="nb-NO" dirty="0" smtClean="0"/>
+          </a:p>
+          <a:p>
+            <a:pPr marL="0" indent="0">
+              <a:lnSpc>
+                <a:spcPct val="100000"/>
+              </a:lnSpc>
+              <a:spcBef>
+                <a:spcPts val="0"/>
+              </a:spcBef>
+              <a:buNone/>
+            </a:pPr>
+            <a:r>
+              <a:rPr lang="nb-NO" dirty="0" smtClean="0"/>
+              <a:t>50	 1-1/2 STORY FINISHED ALL AGES		143302.972222		 144</a:t>
+            </a:r>
+          </a:p>
+          <a:p>
+            <a:pPr marL="0" indent="0">
+              <a:lnSpc>
+                <a:spcPct val="100000"/>
+              </a:lnSpc>
+              <a:spcBef>
+                <a:spcPts val="0"/>
+              </a:spcBef>
+              <a:buNone/>
+            </a:pPr>
+            <a:r>
+              <a:rPr lang="nb-NO" dirty="0" smtClean="0"/>
+              <a:t>60	</a:t>
+            </a:r>
+            <a:r>
+              <a:rPr lang="de-DE" dirty="0" smtClean="0"/>
+              <a:t> 2-STORY 1946 &amp; NEWER			</a:t>
+            </a:r>
+            <a:r>
+              <a:rPr lang="nb-NO" dirty="0" smtClean="0"/>
+              <a:t> 239948.501672		</a:t>
+            </a:r>
+            <a:r>
+              <a:rPr lang="is-IS" dirty="0" smtClean="0"/>
+              <a:t> 299</a:t>
+            </a:r>
+            <a:endParaRPr lang="nb-NO" dirty="0" smtClean="0"/>
+          </a:p>
+          <a:p>
+            <a:pPr marL="0" indent="0">
+              <a:lnSpc>
+                <a:spcPct val="100000"/>
+              </a:lnSpc>
+              <a:spcBef>
+                <a:spcPts val="0"/>
+              </a:spcBef>
+              <a:buNone/>
+            </a:pPr>
+            <a:r>
+              <a:rPr lang="nb-NO" dirty="0" smtClean="0"/>
+              <a:t>70	</a:t>
+            </a:r>
+            <a:r>
+              <a:rPr lang="de-DE" dirty="0" smtClean="0"/>
+              <a:t> 2-STORY 1945 &amp; OLDER			</a:t>
+            </a:r>
+            <a:r>
+              <a:rPr lang="nb-NO" dirty="0" smtClean="0"/>
+              <a:t> 166772.416667		 60</a:t>
+            </a:r>
+          </a:p>
+          <a:p>
+            <a:pPr marL="0" indent="0">
+              <a:lnSpc>
+                <a:spcPct val="100000"/>
+              </a:lnSpc>
+              <a:spcBef>
+                <a:spcPts val="0"/>
+              </a:spcBef>
+              <a:buNone/>
+            </a:pPr>
+            <a:r>
+              <a:rPr lang="nb-NO" dirty="0" smtClean="0"/>
+              <a:t>75	 2-1/2 STORY ALL AGES			 192437.500000		 16</a:t>
+            </a:r>
+          </a:p>
+          <a:p>
+            <a:pPr marL="0" indent="0">
+              <a:lnSpc>
+                <a:spcPct val="100000"/>
+              </a:lnSpc>
+              <a:spcBef>
+                <a:spcPts val="0"/>
+              </a:spcBef>
+              <a:buNone/>
+            </a:pPr>
+            <a:r>
+              <a:rPr lang="nb-NO" dirty="0" smtClean="0"/>
+              <a:t>80	 SPLIT OR MULTI-LEVEL			 169736.551724		</a:t>
+            </a:r>
+            <a:r>
+              <a:rPr lang="ru-RU" dirty="0" smtClean="0"/>
+              <a:t> 58</a:t>
+            </a:r>
+            <a:endParaRPr lang="nb-NO" dirty="0" smtClean="0"/>
+          </a:p>
+          <a:p>
+            <a:pPr marL="0" indent="0">
+              <a:lnSpc>
+                <a:spcPct val="100000"/>
+              </a:lnSpc>
+              <a:spcBef>
+                <a:spcPts val="0"/>
+              </a:spcBef>
+              <a:buNone/>
+            </a:pPr>
+            <a:r>
+              <a:rPr lang="nb-NO" dirty="0" smtClean="0"/>
+              <a:t>85	 SPLIT FOYER				 147810.000000		</a:t>
+            </a:r>
+            <a:r>
+              <a:rPr lang="is-IS" dirty="0" smtClean="0"/>
+              <a:t> 20</a:t>
+            </a:r>
+            <a:endParaRPr lang="nb-NO" dirty="0" smtClean="0"/>
+          </a:p>
+          <a:p>
+            <a:pPr marL="0" indent="0">
+              <a:lnSpc>
+                <a:spcPct val="100000"/>
+              </a:lnSpc>
+              <a:spcBef>
+                <a:spcPts val="0"/>
+              </a:spcBef>
+              <a:buNone/>
+            </a:pPr>
+            <a:r>
+              <a:rPr lang="nb-NO" dirty="0" smtClean="0"/>
+              <a:t>90	 DUPLEX - ALL STYLES AND AGES		 133541.076923		</a:t>
+            </a:r>
+            <a:r>
+              <a:rPr lang="is-IS" dirty="0" smtClean="0"/>
+              <a:t> 52</a:t>
+            </a:r>
+            <a:endParaRPr lang="nb-NO" dirty="0" smtClean="0"/>
+          </a:p>
+          <a:p>
+            <a:pPr marL="0" indent="0">
+              <a:lnSpc>
+                <a:spcPct val="100000"/>
+              </a:lnSpc>
+              <a:spcBef>
+                <a:spcPts val="0"/>
+              </a:spcBef>
+              <a:buNone/>
+            </a:pPr>
+            <a:r>
+              <a:rPr lang="nb-NO" dirty="0" smtClean="0"/>
+              <a:t>120	 1-STORY PUD (</a:t>
+            </a:r>
+            <a:r>
+              <a:rPr lang="nb-NO" dirty="0" err="1" smtClean="0"/>
+              <a:t>Planned</a:t>
+            </a:r>
+            <a:r>
+              <a:rPr lang="nb-NO" dirty="0" smtClean="0"/>
+              <a:t> Unit Development) - 1946 &amp; NEWER	 200779.080460		</a:t>
+            </a:r>
+            <a:r>
+              <a:rPr lang="fi-FI" dirty="0" smtClean="0"/>
+              <a:t> 87</a:t>
+            </a:r>
+            <a:endParaRPr lang="nb-NO" dirty="0" smtClean="0"/>
+          </a:p>
+          <a:p>
+            <a:pPr marL="0" indent="0">
+              <a:lnSpc>
+                <a:spcPct val="100000"/>
+              </a:lnSpc>
+              <a:spcBef>
+                <a:spcPts val="0"/>
+              </a:spcBef>
+              <a:buNone/>
+            </a:pPr>
+            <a:r>
+              <a:rPr lang="nb-NO" dirty="0" smtClean="0"/>
+              <a:t>160 	 1-1/2 STORY PUD - ALL AGES 		138647.380952		</a:t>
+            </a:r>
+            <a:r>
+              <a:rPr lang="is-IS" dirty="0" smtClean="0"/>
+              <a:t> 63</a:t>
+            </a:r>
+            <a:endParaRPr lang="nb-NO" dirty="0" smtClean="0"/>
+          </a:p>
+          <a:p>
+            <a:pPr marL="0" indent="0">
+              <a:lnSpc>
+                <a:spcPct val="100000"/>
+              </a:lnSpc>
+              <a:spcBef>
+                <a:spcPts val="0"/>
+              </a:spcBef>
+              <a:buNone/>
+            </a:pPr>
+            <a:r>
+              <a:rPr lang="nb-NO" dirty="0" smtClean="0"/>
+              <a:t>180 	</a:t>
+            </a:r>
+            <a:r>
+              <a:rPr lang="de-DE" dirty="0" smtClean="0"/>
+              <a:t> 2-STORY PUD - 1946 &amp; NEWER 		</a:t>
+            </a:r>
+            <a:r>
+              <a:rPr lang="nb-NO" dirty="0" smtClean="0"/>
+              <a:t>102300.000000		</a:t>
+            </a:r>
+            <a:r>
+              <a:rPr lang="fi-FI" dirty="0" smtClean="0"/>
+              <a:t> 10</a:t>
+            </a:r>
+            <a:endParaRPr lang="nb-NO" dirty="0" smtClean="0"/>
+          </a:p>
+          <a:p>
+            <a:pPr marL="0" indent="0">
+              <a:lnSpc>
+                <a:spcPct val="100000"/>
+              </a:lnSpc>
+              <a:spcBef>
+                <a:spcPts val="0"/>
+              </a:spcBef>
+              <a:buNone/>
+            </a:pPr>
+            <a:r>
+              <a:rPr lang="nb-NO" dirty="0" smtClean="0"/>
+              <a:t>190 	 PUD - MULTILEVEL - INCL SPLIT LEV/FOYER 	129613.333333		 30</a:t>
+            </a:r>
+            <a:endParaRPr lang="en-US" dirty="0"/>
+          </a:p>
+        </p:txBody>
+      </p:sp>
+    </p:spTree>
+    <p:extLst>
+      <p:ext uri="{BB962C8B-B14F-4D97-AF65-F5344CB8AC3E}">
+        <p14:creationId xmlns:p14="http://schemas.microsoft.com/office/powerpoint/2010/main" val="1138865190"/>
+      </p:ext>
+    </p:extLst>
+  </p:cSld>
+  <p:clrMapOvr>
+    <a:masterClrMapping/>
+  </p:clrMapOvr>
+</p:sld>
+</file>
+
+<file path=ppt/slides/slide5.xml><?xml version="1.0" encoding="utf-8"?>
+<p:sld xmlns:a="http://schemas.openxmlformats.org/drawingml/2006/main" xmlns:r="http://schemas.openxmlformats.org/officeDocument/2006/relationships" xmlns:p="http://schemas.openxmlformats.org/presentationml/2006/main">
+  <p:cSld>
+    <p:spTree>
+      <p:nvGrpSpPr>
+        <p:cNvPr id="1" name=""/>
+        <p:cNvGrpSpPr/>
+        <p:nvPr/>
+      </p:nvGrpSpPr>
+      <p:grpSpPr>
+        <a:xfrm>
+          <a:off x="0" y="0"/>
+          <a:ext cx="0" cy="0"/>
+          <a:chOff x="0" y="0"/>
+          <a:chExt cx="0" cy="0"/>
+        </a:xfrm>
+      </p:grpSpPr>
+      <p:sp>
+        <p:nvSpPr>
+          <p:cNvPr id="2" name="Title 1"/>
+          <p:cNvSpPr>
+            <a:spLocks noGrp="1"/>
+          </p:cNvSpPr>
+          <p:nvPr>
+            <p:ph type="title"/>
+          </p:nvPr>
+        </p:nvSpPr>
+        <p:spPr>
+          <a:xfrm>
+            <a:off x="110169" y="11017"/>
+            <a:ext cx="9573658" cy="1325563"/>
+          </a:xfrm>
+        </p:spPr>
+        <p:txBody>
+          <a:bodyPr/>
+          <a:lstStyle/>
+          <a:p>
+            <a:r>
+              <a:rPr lang="en-US" dirty="0" err="1" smtClean="0"/>
+              <a:t>MSSubClass</a:t>
+            </a:r>
+            <a:endParaRPr lang="en-US" dirty="0"/>
+          </a:p>
+        </p:txBody>
+      </p:sp>
+      <p:sp>
+        <p:nvSpPr>
+          <p:cNvPr id="3" name="Content Placeholder 2"/>
+          <p:cNvSpPr>
+            <a:spLocks noGrp="1"/>
+          </p:cNvSpPr>
+          <p:nvPr>
+            <p:ph idx="1"/>
+          </p:nvPr>
+        </p:nvSpPr>
+        <p:spPr>
+          <a:xfrm>
+            <a:off x="838200" y="1325563"/>
+            <a:ext cx="4403151" cy="1776891"/>
+          </a:xfrm>
+        </p:spPr>
+        <p:txBody>
+          <a:bodyPr>
+            <a:normAutofit fontScale="92500"/>
+          </a:bodyPr>
+          <a:lstStyle/>
+          <a:p>
+            <a:r>
+              <a:rPr lang="en-US" sz="1400" dirty="0" smtClean="0"/>
+              <a:t>Important feature</a:t>
+            </a:r>
+          </a:p>
+          <a:p>
+            <a:r>
+              <a:rPr lang="en-US" sz="1400" dirty="0" smtClean="0"/>
+              <a:t>contain too much information</a:t>
+            </a:r>
+          </a:p>
+          <a:p>
+            <a:r>
+              <a:rPr lang="en-US" sz="1400" dirty="0" smtClean="0"/>
+              <a:t>Share info with </a:t>
+            </a:r>
+            <a:r>
+              <a:rPr lang="en-US" sz="1400" dirty="0" err="1" smtClean="0"/>
+              <a:t>HouseType</a:t>
+            </a:r>
+            <a:r>
+              <a:rPr lang="en-US" sz="1400" dirty="0" smtClean="0"/>
+              <a:t>, </a:t>
+            </a:r>
+            <a:r>
+              <a:rPr lang="en-US" sz="1400" dirty="0" err="1" smtClean="0"/>
+              <a:t>Year_built</a:t>
+            </a:r>
+            <a:endParaRPr lang="en-US" sz="1400" dirty="0" smtClean="0"/>
+          </a:p>
+          <a:p>
+            <a:r>
+              <a:rPr lang="en-US" sz="1400" dirty="0" smtClean="0"/>
+              <a:t>Type of Int64 make no sense. Should change to category </a:t>
+            </a:r>
+          </a:p>
+          <a:p>
+            <a:r>
+              <a:rPr lang="en-US" sz="1400" dirty="0" smtClean="0"/>
+              <a:t>Should </a:t>
+            </a:r>
+            <a:r>
+              <a:rPr lang="en-US" sz="1400" dirty="0" smtClean="0"/>
+              <a:t>split into different features and combine with others</a:t>
+            </a:r>
+            <a:endParaRPr lang="en-US" sz="1400" dirty="0"/>
+          </a:p>
+        </p:txBody>
+      </p:sp>
+      <p:pic>
+        <p:nvPicPr>
+          <p:cNvPr id="4" name="Picture 3"/>
+          <p:cNvPicPr>
+            <a:picLocks noChangeAspect="1"/>
+          </p:cNvPicPr>
+          <p:nvPr/>
+        </p:nvPicPr>
+        <p:blipFill>
+          <a:blip r:embed="rId2"/>
+          <a:stretch>
+            <a:fillRect/>
+          </a:stretch>
+        </p:blipFill>
+        <p:spPr>
+          <a:xfrm>
+            <a:off x="6707475" y="2333"/>
+            <a:ext cx="4940300" cy="3352800"/>
+          </a:xfrm>
+          <a:prstGeom prst="rect">
+            <a:avLst/>
+          </a:prstGeom>
+        </p:spPr>
+      </p:pic>
+      <p:pic>
+        <p:nvPicPr>
+          <p:cNvPr id="5" name="Picture 4"/>
+          <p:cNvPicPr>
+            <a:picLocks noChangeAspect="1"/>
+          </p:cNvPicPr>
+          <p:nvPr/>
+        </p:nvPicPr>
+        <p:blipFill>
+          <a:blip r:embed="rId3"/>
+          <a:stretch>
+            <a:fillRect/>
+          </a:stretch>
+        </p:blipFill>
+        <p:spPr>
+          <a:xfrm>
+            <a:off x="549381" y="3255980"/>
+            <a:ext cx="4914900" cy="3314700"/>
+          </a:xfrm>
+          <a:prstGeom prst="rect">
+            <a:avLst/>
+          </a:prstGeom>
+        </p:spPr>
+      </p:pic>
+      <p:pic>
+        <p:nvPicPr>
+          <p:cNvPr id="6" name="Picture 5"/>
+          <p:cNvPicPr>
+            <a:picLocks noChangeAspect="1"/>
+          </p:cNvPicPr>
+          <p:nvPr/>
+        </p:nvPicPr>
+        <p:blipFill>
+          <a:blip r:embed="rId4"/>
+          <a:stretch>
+            <a:fillRect/>
+          </a:stretch>
+        </p:blipFill>
+        <p:spPr>
+          <a:xfrm>
+            <a:off x="6707475" y="3344116"/>
+            <a:ext cx="4940300" cy="3314700"/>
+          </a:xfrm>
+          <a:prstGeom prst="rect">
+            <a:avLst/>
+          </a:prstGeom>
+        </p:spPr>
+      </p:pic>
+    </p:spTree>
+    <p:extLst>
+      <p:ext uri="{BB962C8B-B14F-4D97-AF65-F5344CB8AC3E}">
+        <p14:creationId xmlns:p14="http://schemas.microsoft.com/office/powerpoint/2010/main" val="755949707"/>
+      </p:ext>
+    </p:extLst>
+  </p:cSld>
+  <p:clrMapOvr>
+    <a:masterClrMapping/>
+  </p:clrMapOvr>
+</p:sld>
+</file>
+
+<file path=ppt/slides/slide6.xml><?xml version="1.0" encoding="utf-8"?>
+<p:sld xmlns:a="http://schemas.openxmlformats.org/drawingml/2006/main" xmlns:r="http://schemas.openxmlformats.org/officeDocument/2006/relationships" xmlns:p="http://schemas.openxmlformats.org/presentationml/2006/main">
+  <p:cSld>
+    <p:spTree>
+      <p:nvGrpSpPr>
+        <p:cNvPr id="1" name=""/>
+        <p:cNvGrpSpPr/>
+        <p:nvPr/>
+      </p:nvGrpSpPr>
+      <p:grpSpPr>
+        <a:xfrm>
+          <a:off x="0" y="0"/>
+          <a:ext cx="0" cy="0"/>
+          <a:chOff x="0" y="0"/>
+          <a:chExt cx="0" cy="0"/>
+        </a:xfrm>
+      </p:grpSpPr>
+      <p:sp>
+        <p:nvSpPr>
+          <p:cNvPr id="2" name="Title 1"/>
+          <p:cNvSpPr>
+            <a:spLocks noGrp="1"/>
+          </p:cNvSpPr>
+          <p:nvPr>
+            <p:ph type="title"/>
+          </p:nvPr>
+        </p:nvSpPr>
+        <p:spPr>
+          <a:xfrm>
+            <a:off x="0" y="0"/>
+            <a:ext cx="10515600" cy="1325563"/>
+          </a:xfrm>
+        </p:spPr>
+        <p:txBody>
+          <a:bodyPr/>
+          <a:lstStyle/>
+          <a:p>
+            <a:r>
+              <a:rPr lang="en-US" dirty="0" err="1" smtClean="0"/>
+              <a:t>YearBuilt</a:t>
+            </a:r>
+            <a:endParaRPr lang="en-US" dirty="0"/>
+          </a:p>
+        </p:txBody>
+      </p:sp>
+      <p:sp>
+        <p:nvSpPr>
+          <p:cNvPr id="3" name="Content Placeholder 2"/>
+          <p:cNvSpPr>
+            <a:spLocks noGrp="1"/>
+          </p:cNvSpPr>
+          <p:nvPr>
+            <p:ph idx="1"/>
+          </p:nvPr>
+        </p:nvSpPr>
+        <p:spPr>
+          <a:xfrm>
+            <a:off x="193623" y="1332421"/>
+            <a:ext cx="6592767" cy="1248081"/>
+          </a:xfrm>
+        </p:spPr>
+        <p:txBody>
+          <a:bodyPr>
+            <a:normAutofit fontScale="55000" lnSpcReduction="20000"/>
+          </a:bodyPr>
+          <a:lstStyle/>
+          <a:p>
+            <a:r>
+              <a:rPr lang="en-US" dirty="0" smtClean="0"/>
+              <a:t>Price:</a:t>
+            </a:r>
+          </a:p>
+          <a:p>
+            <a:pPr lvl="1"/>
+            <a:r>
+              <a:rPr lang="en-US" dirty="0" smtClean="0"/>
+              <a:t>before 1945, not linear. After 1945, linear</a:t>
+            </a:r>
+          </a:p>
+          <a:p>
+            <a:pPr lvl="1"/>
+            <a:r>
+              <a:rPr lang="en-US" dirty="0" smtClean="0"/>
+              <a:t>Thus for </a:t>
+            </a:r>
+            <a:r>
+              <a:rPr lang="en-US" dirty="0" err="1" smtClean="0"/>
+              <a:t>Muti</a:t>
+            </a:r>
+            <a:r>
+              <a:rPr lang="en-US" dirty="0" smtClean="0"/>
+              <a:t>, linear model:</a:t>
+            </a:r>
+          </a:p>
+          <a:p>
+            <a:pPr lvl="2"/>
+            <a:r>
+              <a:rPr lang="en-US" dirty="0" smtClean="0"/>
+              <a:t> ‘1945 before’=0, 1946=1, 1947=2, 1948=3</a:t>
+            </a:r>
+            <a:r>
+              <a:rPr lang="mr-IN" dirty="0" smtClean="0"/>
+              <a:t>…</a:t>
+            </a:r>
+            <a:endParaRPr lang="en-US" dirty="0" smtClean="0"/>
+          </a:p>
+          <a:p>
+            <a:r>
+              <a:rPr lang="en-US" dirty="0" smtClean="0"/>
+              <a:t>count</a:t>
+            </a:r>
+            <a:endParaRPr lang="en-US" dirty="0"/>
+          </a:p>
+        </p:txBody>
+      </p:sp>
+      <p:pic>
+        <p:nvPicPr>
+          <p:cNvPr id="4" name="Picture 3"/>
+          <p:cNvPicPr>
+            <a:picLocks noChangeAspect="1"/>
+          </p:cNvPicPr>
+          <p:nvPr/>
+        </p:nvPicPr>
+        <p:blipFill>
+          <a:blip r:embed="rId2"/>
+          <a:stretch>
+            <a:fillRect/>
+          </a:stretch>
+        </p:blipFill>
+        <p:spPr>
+          <a:xfrm>
+            <a:off x="838200" y="2919882"/>
+            <a:ext cx="4838700" cy="3352800"/>
+          </a:xfrm>
+          <a:prstGeom prst="rect">
+            <a:avLst/>
+          </a:prstGeom>
+        </p:spPr>
+      </p:pic>
+      <p:pic>
+        <p:nvPicPr>
+          <p:cNvPr id="5" name="Picture 4"/>
+          <p:cNvPicPr>
+            <a:picLocks noChangeAspect="1"/>
+          </p:cNvPicPr>
+          <p:nvPr/>
+        </p:nvPicPr>
+        <p:blipFill>
+          <a:blip r:embed="rId3"/>
+          <a:stretch>
+            <a:fillRect/>
+          </a:stretch>
+        </p:blipFill>
+        <p:spPr>
+          <a:xfrm>
+            <a:off x="6096000" y="3379719"/>
+            <a:ext cx="4940300" cy="3314700"/>
+          </a:xfrm>
+          <a:prstGeom prst="rect">
+            <a:avLst/>
+          </a:prstGeom>
+        </p:spPr>
+      </p:pic>
+      <p:pic>
+        <p:nvPicPr>
+          <p:cNvPr id="6" name="Picture 5"/>
+          <p:cNvPicPr>
+            <a:picLocks noChangeAspect="1"/>
+          </p:cNvPicPr>
+          <p:nvPr/>
+        </p:nvPicPr>
+        <p:blipFill>
+          <a:blip r:embed="rId4"/>
+          <a:stretch>
+            <a:fillRect/>
+          </a:stretch>
+        </p:blipFill>
+        <p:spPr>
+          <a:xfrm>
+            <a:off x="6096000" y="0"/>
+            <a:ext cx="4940300" cy="3314700"/>
+          </a:xfrm>
+          <a:prstGeom prst="rect">
+            <a:avLst/>
+          </a:prstGeom>
+        </p:spPr>
+      </p:pic>
+    </p:spTree>
+    <p:extLst>
+      <p:ext uri="{BB962C8B-B14F-4D97-AF65-F5344CB8AC3E}">
+        <p14:creationId xmlns:p14="http://schemas.microsoft.com/office/powerpoint/2010/main" val="2041449711"/>
+      </p:ext>
+    </p:extLst>
+  </p:cSld>
+  <p:clrMapOvr>
+    <a:masterClrMapping/>
+  </p:clrMapOvr>
+</p:sld>
+</file>
+
+<file path=ppt/slides/slide7.xml><?xml version="1.0" encoding="utf-8"?>
+<p:sld xmlns:a="http://schemas.openxmlformats.org/drawingml/2006/main" xmlns:r="http://schemas.openxmlformats.org/officeDocument/2006/relationships" xmlns:p="http://schemas.openxmlformats.org/presentationml/2006/main">
+  <p:cSld>
+    <p:spTree>
+      <p:nvGrpSpPr>
+        <p:cNvPr id="1" name=""/>
+        <p:cNvGrpSpPr/>
+        <p:nvPr/>
+      </p:nvGrpSpPr>
+      <p:grpSpPr>
+        <a:xfrm>
+          <a:off x="0" y="0"/>
+          <a:ext cx="0" cy="0"/>
+          <a:chOff x="0" y="0"/>
+          <a:chExt cx="0" cy="0"/>
+        </a:xfrm>
+      </p:grpSpPr>
+      <p:sp>
+        <p:nvSpPr>
+          <p:cNvPr id="2" name="Title 1"/>
+          <p:cNvSpPr>
+            <a:spLocks noGrp="1"/>
+          </p:cNvSpPr>
+          <p:nvPr>
+            <p:ph type="title"/>
+          </p:nvPr>
+        </p:nvSpPr>
+        <p:spPr/>
+        <p:txBody>
+          <a:bodyPr/>
+          <a:lstStyle/>
+          <a:p>
+            <a:r>
+              <a:rPr lang="en-US" dirty="0" err="1" smtClean="0"/>
+              <a:t>YearRemodAdd</a:t>
+            </a:r>
+            <a:endParaRPr lang="en-US" dirty="0"/>
+          </a:p>
+        </p:txBody>
+      </p:sp>
+      <p:sp>
+        <p:nvSpPr>
+          <p:cNvPr id="3" name="Content Placeholder 2"/>
+          <p:cNvSpPr>
+            <a:spLocks noGrp="1"/>
+          </p:cNvSpPr>
+          <p:nvPr>
+            <p:ph idx="1"/>
+          </p:nvPr>
+        </p:nvSpPr>
+        <p:spPr>
+          <a:xfrm>
+            <a:off x="838200" y="1586429"/>
+            <a:ext cx="5121925" cy="1377108"/>
+          </a:xfrm>
+        </p:spPr>
+        <p:txBody>
+          <a:bodyPr>
+            <a:normAutofit fontScale="47500" lnSpcReduction="20000"/>
+          </a:bodyPr>
+          <a:lstStyle/>
+          <a:p>
+            <a:r>
+              <a:rPr lang="en-US" dirty="0" smtClean="0"/>
+              <a:t>All value later than 1950</a:t>
+            </a:r>
+          </a:p>
+          <a:p>
+            <a:r>
+              <a:rPr lang="en-US" dirty="0" smtClean="0"/>
+              <a:t>Linearity with Price</a:t>
+            </a:r>
+          </a:p>
+          <a:p>
+            <a:r>
+              <a:rPr lang="en-US" dirty="0" smtClean="0"/>
+              <a:t>Numbers in 1950 is huge</a:t>
+            </a:r>
+          </a:p>
+          <a:p>
+            <a:r>
+              <a:rPr lang="en-US" dirty="0" smtClean="0"/>
+              <a:t>May use this feature. Set 1950 as 0. 1951 as 1, 1952, as 2 </a:t>
+            </a:r>
+            <a:r>
+              <a:rPr lang="mr-IN" dirty="0" smtClean="0"/>
+              <a:t>…</a:t>
+            </a:r>
+            <a:r>
+              <a:rPr lang="en-US" dirty="0" smtClean="0"/>
+              <a:t>.</a:t>
+            </a:r>
+          </a:p>
+          <a:p>
+            <a:r>
+              <a:rPr lang="en-US" dirty="0" smtClean="0"/>
+              <a:t>And drop the </a:t>
+            </a:r>
+            <a:r>
+              <a:rPr lang="en-US" dirty="0" err="1" smtClean="0"/>
+              <a:t>YearBuilt</a:t>
+            </a:r>
+            <a:r>
+              <a:rPr lang="en-US" dirty="0" smtClean="0"/>
+              <a:t> column</a:t>
+            </a:r>
+          </a:p>
+          <a:p>
+            <a:endParaRPr lang="en-US" dirty="0"/>
+          </a:p>
+        </p:txBody>
+      </p:sp>
+      <p:pic>
+        <p:nvPicPr>
+          <p:cNvPr id="4" name="Picture 3"/>
+          <p:cNvPicPr>
+            <a:picLocks noChangeAspect="1"/>
+          </p:cNvPicPr>
+          <p:nvPr/>
+        </p:nvPicPr>
+        <p:blipFill>
+          <a:blip r:embed="rId2"/>
+          <a:stretch>
+            <a:fillRect/>
+          </a:stretch>
+        </p:blipFill>
+        <p:spPr>
+          <a:xfrm>
+            <a:off x="6833744" y="0"/>
+            <a:ext cx="4940300" cy="3314700"/>
+          </a:xfrm>
+          <a:prstGeom prst="rect">
+            <a:avLst/>
+          </a:prstGeom>
+        </p:spPr>
+      </p:pic>
+      <p:pic>
+        <p:nvPicPr>
+          <p:cNvPr id="5" name="Picture 4"/>
+          <p:cNvPicPr>
+            <a:picLocks noChangeAspect="1"/>
+          </p:cNvPicPr>
+          <p:nvPr/>
+        </p:nvPicPr>
+        <p:blipFill>
+          <a:blip r:embed="rId3"/>
+          <a:stretch>
+            <a:fillRect/>
+          </a:stretch>
+        </p:blipFill>
+        <p:spPr>
+          <a:xfrm>
+            <a:off x="838200" y="2880922"/>
+            <a:ext cx="4914900" cy="3314700"/>
+          </a:xfrm>
+          <a:prstGeom prst="rect">
+            <a:avLst/>
+          </a:prstGeom>
+        </p:spPr>
+      </p:pic>
+      <p:pic>
+        <p:nvPicPr>
+          <p:cNvPr id="6" name="Picture 5"/>
+          <p:cNvPicPr>
+            <a:picLocks noChangeAspect="1"/>
+          </p:cNvPicPr>
+          <p:nvPr/>
+        </p:nvPicPr>
+        <p:blipFill>
+          <a:blip r:embed="rId4"/>
+          <a:stretch>
+            <a:fillRect/>
+          </a:stretch>
+        </p:blipFill>
+        <p:spPr>
+          <a:xfrm>
+            <a:off x="6833744" y="3314700"/>
+            <a:ext cx="4940300" cy="3314700"/>
+          </a:xfrm>
+          <a:prstGeom prst="rect">
+            <a:avLst/>
+          </a:prstGeom>
+        </p:spPr>
+      </p:pic>
+    </p:spTree>
+    <p:extLst>
+      <p:ext uri="{BB962C8B-B14F-4D97-AF65-F5344CB8AC3E}">
+        <p14:creationId xmlns:p14="http://schemas.microsoft.com/office/powerpoint/2010/main" val="63221883"/>
+      </p:ext>
+    </p:extLst>
+  </p:cSld>
+  <p:clrMapOvr>
+    <a:masterClrMapping/>
+  </p:clrMapOvr>
+</p:sld>
+</file>
+
+<file path=ppt/slides/slide8.xml><?xml version="1.0" encoding="utf-8"?>
+<p:sld xmlns:a="http://schemas.openxmlformats.org/drawingml/2006/main" xmlns:r="http://schemas.openxmlformats.org/officeDocument/2006/relationships" xmlns:p="http://schemas.openxmlformats.org/presentationml/2006/main">
+  <p:cSld>
+    <p:spTree>
+      <p:nvGrpSpPr>
+        <p:cNvPr id="1" name=""/>
+        <p:cNvGrpSpPr/>
+        <p:nvPr/>
+      </p:nvGrpSpPr>
+      <p:grpSpPr>
+        <a:xfrm>
+          <a:off x="0" y="0"/>
+          <a:ext cx="0" cy="0"/>
+          <a:chOff x="0" y="0"/>
+          <a:chExt cx="0" cy="0"/>
+        </a:xfrm>
+      </p:grpSpPr>
+      <p:sp>
+        <p:nvSpPr>
+          <p:cNvPr id="2" name="Title 1"/>
+          <p:cNvSpPr>
+            <a:spLocks noGrp="1"/>
+          </p:cNvSpPr>
+          <p:nvPr>
+            <p:ph type="title"/>
+          </p:nvPr>
+        </p:nvSpPr>
+        <p:spPr/>
+        <p:txBody>
+          <a:bodyPr/>
+          <a:lstStyle/>
+          <a:p>
+            <a:r>
+              <a:rPr lang="en-US" dirty="0" err="1" smtClean="0"/>
+              <a:t>HouseStyle</a:t>
+            </a:r>
+            <a:r>
+              <a:rPr lang="en-US" dirty="0" smtClean="0"/>
+              <a:t>:</a:t>
+            </a:r>
+            <a:r>
+              <a:rPr lang="en-US" dirty="0" smtClean="0"/>
+              <a:t> Style of dwelling</a:t>
+            </a:r>
+            <a:endParaRPr lang="en-US" dirty="0"/>
+          </a:p>
+        </p:txBody>
+      </p:sp>
+      <p:sp>
+        <p:nvSpPr>
+          <p:cNvPr id="3" name="Content Placeholder 2"/>
+          <p:cNvSpPr>
+            <a:spLocks noGrp="1"/>
+          </p:cNvSpPr>
+          <p:nvPr>
+            <p:ph idx="1"/>
+          </p:nvPr>
+        </p:nvSpPr>
+        <p:spPr>
+          <a:xfrm>
+            <a:off x="838200" y="1825625"/>
+            <a:ext cx="6344798" cy="3616708"/>
+          </a:xfrm>
+        </p:spPr>
+        <p:txBody>
+          <a:bodyPr>
+            <a:normAutofit/>
+          </a:bodyPr>
+          <a:lstStyle/>
+          <a:p>
+            <a:r>
+              <a:rPr lang="en-US" sz="1400" dirty="0" smtClean="0"/>
+              <a:t>1Story	 One story</a:t>
+            </a:r>
+          </a:p>
+          <a:p>
+            <a:r>
+              <a:rPr lang="en-US" sz="1400" dirty="0" smtClean="0"/>
+              <a:t> 1.5Fin	 One and one-half story: 2nd level finished </a:t>
+            </a:r>
+          </a:p>
+          <a:p>
+            <a:r>
+              <a:rPr lang="en-US" sz="1400" dirty="0" smtClean="0"/>
+              <a:t>1.5Unf 	One and one-half story: 2nd level unfinished</a:t>
+            </a:r>
+          </a:p>
+          <a:p>
+            <a:r>
+              <a:rPr lang="en-US" sz="1400" dirty="0" smtClean="0"/>
+              <a:t> 2Story 	Two story</a:t>
+            </a:r>
+          </a:p>
+          <a:p>
+            <a:r>
+              <a:rPr lang="en-US" sz="1400" dirty="0" smtClean="0"/>
+              <a:t> 2.5Fin 	Two and one-half story: 2nd level finished </a:t>
+            </a:r>
+          </a:p>
+          <a:p>
+            <a:r>
+              <a:rPr lang="en-US" sz="1400" dirty="0" smtClean="0"/>
+              <a:t>2.5Unf 	Two and one-half story: 2nd level unfinished</a:t>
+            </a:r>
+          </a:p>
+          <a:p>
+            <a:r>
+              <a:rPr lang="en-US" sz="1400" dirty="0" smtClean="0"/>
+              <a:t> </a:t>
+            </a:r>
+            <a:r>
+              <a:rPr lang="en-US" sz="1400" dirty="0" err="1" smtClean="0"/>
+              <a:t>SFoyer</a:t>
+            </a:r>
+            <a:r>
+              <a:rPr lang="en-US" sz="1400" dirty="0" smtClean="0"/>
+              <a:t> 	Split Foyer</a:t>
+            </a:r>
+          </a:p>
+          <a:p>
+            <a:r>
+              <a:rPr lang="en-US" sz="1400" dirty="0" smtClean="0"/>
+              <a:t> </a:t>
+            </a:r>
+            <a:r>
+              <a:rPr lang="en-US" sz="1400" dirty="0" err="1" smtClean="0"/>
+              <a:t>SLvl</a:t>
+            </a:r>
+            <a:r>
+              <a:rPr lang="en-US" sz="1400" dirty="0" smtClean="0"/>
+              <a:t> 	Split Level</a:t>
+            </a:r>
+            <a:endParaRPr lang="en-US" sz="1400" dirty="0"/>
+          </a:p>
+        </p:txBody>
+      </p:sp>
+    </p:spTree>
+    <p:extLst>
+      <p:ext uri="{BB962C8B-B14F-4D97-AF65-F5344CB8AC3E}">
+        <p14:creationId xmlns:p14="http://schemas.microsoft.com/office/powerpoint/2010/main" val="1909189713"/>
       </p:ext>
     </p:extLst>
   </p:cSld>

</xml_diff>